<commit_message>
Examples for External Configurations
</commit_message>
<xml_diff>
--- a/info/SpringBootDocumentation.pptx
+++ b/info/SpringBootDocumentation.pptx
@@ -10,6 +10,8 @@
     <p:sldId id="257" r:id="rId4"/>
     <p:sldId id="258" r:id="rId5"/>
     <p:sldId id="259" r:id="rId6"/>
+    <p:sldId id="261" r:id="rId7"/>
+    <p:sldId id="262" r:id="rId8"/>
   </p:sldIdLst>
   <p:sldSz cx="9144000" cy="6858000" type="screen4x3"/>
   <p:notesSz cx="6858000" cy="9144000"/>
@@ -292,7 +294,7 @@
           <a:p>
             <a:fld id="{8BC95D7C-F206-4196-95B1-2023B832261D}" type="datetimeFigureOut">
               <a:rPr lang="en-US" smtClean="0"/>
-              <a:t>9/25/2017</a:t>
+              <a:t>9/26/2017</a:t>
             </a:fld>
             <a:endParaRPr lang="en-US"/>
           </a:p>
@@ -462,7 +464,7 @@
           <a:p>
             <a:fld id="{8BC95D7C-F206-4196-95B1-2023B832261D}" type="datetimeFigureOut">
               <a:rPr lang="en-US" smtClean="0"/>
-              <a:t>9/25/2017</a:t>
+              <a:t>9/26/2017</a:t>
             </a:fld>
             <a:endParaRPr lang="en-US"/>
           </a:p>
@@ -642,7 +644,7 @@
           <a:p>
             <a:fld id="{8BC95D7C-F206-4196-95B1-2023B832261D}" type="datetimeFigureOut">
               <a:rPr lang="en-US" smtClean="0"/>
-              <a:t>9/25/2017</a:t>
+              <a:t>9/26/2017</a:t>
             </a:fld>
             <a:endParaRPr lang="en-US"/>
           </a:p>
@@ -812,7 +814,7 @@
           <a:p>
             <a:fld id="{8BC95D7C-F206-4196-95B1-2023B832261D}" type="datetimeFigureOut">
               <a:rPr lang="en-US" smtClean="0"/>
-              <a:t>9/25/2017</a:t>
+              <a:t>9/26/2017</a:t>
             </a:fld>
             <a:endParaRPr lang="en-US"/>
           </a:p>
@@ -1058,7 +1060,7 @@
           <a:p>
             <a:fld id="{8BC95D7C-F206-4196-95B1-2023B832261D}" type="datetimeFigureOut">
               <a:rPr lang="en-US" smtClean="0"/>
-              <a:t>9/25/2017</a:t>
+              <a:t>9/26/2017</a:t>
             </a:fld>
             <a:endParaRPr lang="en-US"/>
           </a:p>
@@ -1346,7 +1348,7 @@
           <a:p>
             <a:fld id="{8BC95D7C-F206-4196-95B1-2023B832261D}" type="datetimeFigureOut">
               <a:rPr lang="en-US" smtClean="0"/>
-              <a:t>9/25/2017</a:t>
+              <a:t>9/26/2017</a:t>
             </a:fld>
             <a:endParaRPr lang="en-US"/>
           </a:p>
@@ -1768,7 +1770,7 @@
           <a:p>
             <a:fld id="{8BC95D7C-F206-4196-95B1-2023B832261D}" type="datetimeFigureOut">
               <a:rPr lang="en-US" smtClean="0"/>
-              <a:t>9/25/2017</a:t>
+              <a:t>9/26/2017</a:t>
             </a:fld>
             <a:endParaRPr lang="en-US"/>
           </a:p>
@@ -1886,7 +1888,7 @@
           <a:p>
             <a:fld id="{8BC95D7C-F206-4196-95B1-2023B832261D}" type="datetimeFigureOut">
               <a:rPr lang="en-US" smtClean="0"/>
-              <a:t>9/25/2017</a:t>
+              <a:t>9/26/2017</a:t>
             </a:fld>
             <a:endParaRPr lang="en-US"/>
           </a:p>
@@ -1981,7 +1983,7 @@
           <a:p>
             <a:fld id="{8BC95D7C-F206-4196-95B1-2023B832261D}" type="datetimeFigureOut">
               <a:rPr lang="en-US" smtClean="0"/>
-              <a:t>9/25/2017</a:t>
+              <a:t>9/26/2017</a:t>
             </a:fld>
             <a:endParaRPr lang="en-US"/>
           </a:p>
@@ -2258,7 +2260,7 @@
           <a:p>
             <a:fld id="{8BC95D7C-F206-4196-95B1-2023B832261D}" type="datetimeFigureOut">
               <a:rPr lang="en-US" smtClean="0"/>
-              <a:t>9/25/2017</a:t>
+              <a:t>9/26/2017</a:t>
             </a:fld>
             <a:endParaRPr lang="en-US"/>
           </a:p>
@@ -2511,7 +2513,7 @@
           <a:p>
             <a:fld id="{8BC95D7C-F206-4196-95B1-2023B832261D}" type="datetimeFigureOut">
               <a:rPr lang="en-US" smtClean="0"/>
-              <a:t>9/25/2017</a:t>
+              <a:t>9/26/2017</a:t>
             </a:fld>
             <a:endParaRPr lang="en-US"/>
           </a:p>
@@ -2724,7 +2726,7 @@
           <a:p>
             <a:fld id="{8BC95D7C-F206-4196-95B1-2023B832261D}" type="datetimeFigureOut">
               <a:rPr lang="en-US" smtClean="0"/>
-              <a:t>9/25/2017</a:t>
+              <a:t>9/26/2017</a:t>
             </a:fld>
             <a:endParaRPr lang="en-US"/>
           </a:p>
@@ -4708,6 +4710,1005 @@
     <p:extLst>
       <p:ext uri="{BB962C8B-B14F-4D97-AF65-F5344CB8AC3E}">
         <p14:creationId xmlns:p14="http://schemas.microsoft.com/office/powerpoint/2010/main" val="3705330659"/>
+      </p:ext>
+    </p:extLst>
+  </p:cSld>
+  <p:clrMapOvr>
+    <a:masterClrMapping/>
+  </p:clrMapOvr>
+</p:sld>
+</file>
+
+<file path=ppt/slides/slide6.xml><?xml version="1.0" encoding="utf-8"?>
+<p:sld xmlns:a="http://schemas.openxmlformats.org/drawingml/2006/main" xmlns:r="http://schemas.openxmlformats.org/officeDocument/2006/relationships" xmlns:p="http://schemas.openxmlformats.org/presentationml/2006/main">
+  <p:cSld>
+    <p:spTree>
+      <p:nvGrpSpPr>
+        <p:cNvPr id="1" name=""/>
+        <p:cNvGrpSpPr/>
+        <p:nvPr/>
+      </p:nvGrpSpPr>
+      <p:grpSpPr>
+        <a:xfrm>
+          <a:off x="0" y="0"/>
+          <a:ext cx="0" cy="0"/>
+          <a:chOff x="0" y="0"/>
+          <a:chExt cx="0" cy="0"/>
+        </a:xfrm>
+      </p:grpSpPr>
+      <p:sp>
+        <p:nvSpPr>
+          <p:cNvPr id="13" name="Rectangle 12"/>
+          <p:cNvSpPr/>
+          <p:nvPr/>
+        </p:nvSpPr>
+        <p:spPr>
+          <a:xfrm>
+            <a:off x="381000" y="3657600"/>
+            <a:ext cx="2895600" cy="914400"/>
+          </a:xfrm>
+          <a:prstGeom prst="rect">
+            <a:avLst/>
+          </a:prstGeom>
+        </p:spPr>
+        <p:style>
+          <a:lnRef idx="1">
+            <a:schemeClr val="dk1"/>
+          </a:lnRef>
+          <a:fillRef idx="2">
+            <a:schemeClr val="dk1"/>
+          </a:fillRef>
+          <a:effectRef idx="1">
+            <a:schemeClr val="dk1"/>
+          </a:effectRef>
+          <a:fontRef idx="minor">
+            <a:schemeClr val="dk1"/>
+          </a:fontRef>
+        </p:style>
+        <p:txBody>
+          <a:bodyPr rtlCol="0" anchor="ctr"/>
+          <a:lstStyle/>
+          <a:p>
+            <a:pPr algn="ctr"/>
+            <a:endParaRPr lang="en-US"/>
+          </a:p>
+        </p:txBody>
+      </p:sp>
+      <p:sp>
+        <p:nvSpPr>
+          <p:cNvPr id="12" name="Rectangle 11"/>
+          <p:cNvSpPr/>
+          <p:nvPr/>
+        </p:nvSpPr>
+        <p:spPr>
+          <a:xfrm>
+            <a:off x="381000" y="2057400"/>
+            <a:ext cx="3352800" cy="1143000"/>
+          </a:xfrm>
+          <a:prstGeom prst="rect">
+            <a:avLst/>
+          </a:prstGeom>
+        </p:spPr>
+        <p:style>
+          <a:lnRef idx="1">
+            <a:schemeClr val="dk1"/>
+          </a:lnRef>
+          <a:fillRef idx="2">
+            <a:schemeClr val="dk1"/>
+          </a:fillRef>
+          <a:effectRef idx="1">
+            <a:schemeClr val="dk1"/>
+          </a:effectRef>
+          <a:fontRef idx="minor">
+            <a:schemeClr val="dk1"/>
+          </a:fontRef>
+        </p:style>
+        <p:txBody>
+          <a:bodyPr rtlCol="0" anchor="ctr"/>
+          <a:lstStyle/>
+          <a:p>
+            <a:pPr algn="ctr"/>
+            <a:endParaRPr lang="en-US"/>
+          </a:p>
+        </p:txBody>
+      </p:sp>
+      <p:sp>
+        <p:nvSpPr>
+          <p:cNvPr id="2" name="TextBox 1"/>
+          <p:cNvSpPr txBox="1"/>
+          <p:nvPr/>
+        </p:nvSpPr>
+        <p:spPr>
+          <a:xfrm>
+            <a:off x="381000" y="609600"/>
+            <a:ext cx="6248400" cy="4093428"/>
+          </a:xfrm>
+          <a:prstGeom prst="rect">
+            <a:avLst/>
+          </a:prstGeom>
+          <a:noFill/>
+        </p:spPr>
+        <p:txBody>
+          <a:bodyPr wrap="square" rtlCol="0">
+            <a:spAutoFit/>
+          </a:bodyPr>
+          <a:lstStyle/>
+          <a:p>
+            <a:r>
+              <a:rPr lang="en-US" sz="1200" dirty="0" smtClean="0"/>
+              <a:t>@Bean – to configure external beans</a:t>
+            </a:r>
+          </a:p>
+          <a:p>
+            <a:pPr marL="171450" indent="-171450">
+              <a:buFontTx/>
+              <a:buChar char="-"/>
+            </a:pPr>
+            <a:r>
+              <a:rPr lang="en-US" sz="1200" dirty="0" smtClean="0"/>
+              <a:t>You can define beans external to your application classes by using Java rather than XML files. @Configuration @Bean @Import and @Depends On</a:t>
+            </a:r>
+          </a:p>
+          <a:p>
+            <a:pPr marL="171450" indent="-171450">
+              <a:buFontTx/>
+              <a:buChar char="-"/>
+            </a:pPr>
+            <a:endParaRPr lang="en-US" sz="1200" dirty="0"/>
+          </a:p>
+          <a:p>
+            <a:pPr marL="171450" indent="-171450">
+              <a:buFontTx/>
+              <a:buChar char="-"/>
+            </a:pPr>
+            <a:r>
+              <a:rPr lang="en-US" sz="1200" dirty="0" err="1" smtClean="0"/>
+              <a:t>MessageApp</a:t>
+            </a:r>
+            <a:r>
+              <a:rPr lang="en-US" sz="1200" dirty="0" smtClean="0"/>
+              <a:t> </a:t>
+            </a:r>
+            <a:r>
+              <a:rPr lang="en-US" sz="1200" dirty="0" err="1" smtClean="0"/>
+              <a:t>eg</a:t>
+            </a:r>
+            <a:r>
+              <a:rPr lang="en-US" sz="1200" dirty="0" smtClean="0"/>
+              <a:t>. </a:t>
+            </a:r>
+            <a:r>
+              <a:rPr lang="en-US" sz="1200" dirty="0" err="1" smtClean="0"/>
+              <a:t>WebClient</a:t>
+            </a:r>
+            <a:r>
+              <a:rPr lang="en-US" sz="1200" dirty="0" smtClean="0"/>
+              <a:t> -&gt; @</a:t>
+            </a:r>
+            <a:r>
+              <a:rPr lang="en-US" sz="1200" dirty="0" err="1" smtClean="0"/>
+              <a:t>RestController</a:t>
+            </a:r>
+            <a:r>
+              <a:rPr lang="en-US" sz="1200" dirty="0" smtClean="0"/>
+              <a:t> -&gt; @Component -&gt; Bean</a:t>
+            </a:r>
+          </a:p>
+          <a:p>
+            <a:endParaRPr lang="en-US" sz="1200" dirty="0" smtClean="0"/>
+          </a:p>
+          <a:p>
+            <a:r>
+              <a:rPr lang="en-US" sz="1200" b="1" dirty="0" smtClean="0"/>
+              <a:t>Example for Externalized Bean</a:t>
+            </a:r>
+          </a:p>
+          <a:p>
+            <a:endParaRPr lang="en-US" sz="1200" dirty="0"/>
+          </a:p>
+          <a:p>
+            <a:r>
+              <a:rPr lang="en-US" sz="1000" dirty="0" smtClean="0">
+                <a:solidFill>
+                  <a:srgbClr val="646464"/>
+                </a:solidFill>
+                <a:latin typeface="Courier New"/>
+              </a:rPr>
+              <a:t>@Bean</a:t>
+            </a:r>
+          </a:p>
+          <a:p>
+            <a:r>
+              <a:rPr lang="en-US" sz="1000" b="1" dirty="0" smtClean="0">
+                <a:solidFill>
+                  <a:srgbClr val="7F0055"/>
+                </a:solidFill>
+                <a:latin typeface="Courier New"/>
+              </a:rPr>
+              <a:t>public</a:t>
+            </a:r>
+            <a:r>
+              <a:rPr lang="en-US" sz="1000" b="1" dirty="0" smtClean="0">
+                <a:solidFill>
+                  <a:srgbClr val="000000"/>
+                </a:solidFill>
+                <a:latin typeface="Courier New"/>
+              </a:rPr>
+              <a:t> Message </a:t>
+            </a:r>
+            <a:r>
+              <a:rPr lang="en-US" sz="1000" b="1" dirty="0" err="1" smtClean="0">
+                <a:solidFill>
+                  <a:srgbClr val="000000"/>
+                </a:solidFill>
+                <a:latin typeface="Courier New"/>
+              </a:rPr>
+              <a:t>createMsg</a:t>
+            </a:r>
+            <a:r>
+              <a:rPr lang="en-US" sz="1000" b="1" dirty="0" smtClean="0">
+                <a:solidFill>
+                  <a:srgbClr val="000000"/>
+                </a:solidFill>
+                <a:latin typeface="Courier New"/>
+              </a:rPr>
+              <a:t>() {</a:t>
+            </a:r>
+          </a:p>
+          <a:p>
+            <a:pPr lvl="1"/>
+            <a:r>
+              <a:rPr lang="en-US" sz="1000" dirty="0" smtClean="0">
+                <a:solidFill>
+                  <a:srgbClr val="000000"/>
+                </a:solidFill>
+                <a:latin typeface="Courier New"/>
+              </a:rPr>
+              <a:t>Message </a:t>
+            </a:r>
+            <a:r>
+              <a:rPr lang="en-US" sz="1000" dirty="0" err="1" smtClean="0">
+                <a:solidFill>
+                  <a:srgbClr val="6A3E3E"/>
+                </a:solidFill>
+                <a:highlight>
+                  <a:srgbClr val="F0D8A8"/>
+                </a:highlight>
+                <a:latin typeface="Courier New"/>
+              </a:rPr>
+              <a:t>msg</a:t>
+            </a:r>
+            <a:r>
+              <a:rPr lang="en-US" sz="1000" dirty="0" smtClean="0">
+                <a:solidFill>
+                  <a:srgbClr val="000000"/>
+                </a:solidFill>
+                <a:highlight>
+                  <a:srgbClr val="F0D8A8"/>
+                </a:highlight>
+                <a:latin typeface="Courier New"/>
+              </a:rPr>
+              <a:t> = </a:t>
+            </a:r>
+            <a:r>
+              <a:rPr lang="en-US" sz="1000" b="1" dirty="0" smtClean="0">
+                <a:solidFill>
+                  <a:srgbClr val="7F0055"/>
+                </a:solidFill>
+                <a:highlight>
+                  <a:srgbClr val="F0D8A8"/>
+                </a:highlight>
+                <a:latin typeface="Courier New"/>
+              </a:rPr>
+              <a:t>new</a:t>
+            </a:r>
+            <a:r>
+              <a:rPr lang="en-US" sz="1000" b="1" dirty="0" smtClean="0">
+                <a:solidFill>
+                  <a:srgbClr val="000000"/>
+                </a:solidFill>
+                <a:highlight>
+                  <a:srgbClr val="F0D8A8"/>
+                </a:highlight>
+                <a:latin typeface="Courier New"/>
+              </a:rPr>
+              <a:t> Message();</a:t>
+            </a:r>
+          </a:p>
+          <a:p>
+            <a:pPr lvl="1"/>
+            <a:r>
+              <a:rPr lang="en-US" sz="1000" dirty="0" err="1" smtClean="0">
+                <a:solidFill>
+                  <a:srgbClr val="6A3E3E"/>
+                </a:solidFill>
+                <a:highlight>
+                  <a:srgbClr val="D4D4D4"/>
+                </a:highlight>
+                <a:latin typeface="Courier New"/>
+              </a:rPr>
+              <a:t>msg</a:t>
+            </a:r>
+            <a:r>
+              <a:rPr lang="en-US" sz="1000" dirty="0" err="1" smtClean="0">
+                <a:solidFill>
+                  <a:srgbClr val="000000"/>
+                </a:solidFill>
+                <a:highlight>
+                  <a:srgbClr val="D4D4D4"/>
+                </a:highlight>
+                <a:latin typeface="Courier New"/>
+              </a:rPr>
+              <a:t>.setText</a:t>
+            </a:r>
+            <a:r>
+              <a:rPr lang="en-US" sz="1000" dirty="0" smtClean="0">
+                <a:solidFill>
+                  <a:srgbClr val="000000"/>
+                </a:solidFill>
+                <a:highlight>
+                  <a:srgbClr val="D4D4D4"/>
+                </a:highlight>
+                <a:latin typeface="Courier New"/>
+              </a:rPr>
+              <a:t>(</a:t>
+            </a:r>
+            <a:r>
+              <a:rPr lang="en-US" sz="1000" dirty="0" smtClean="0">
+                <a:solidFill>
+                  <a:srgbClr val="2A00FF"/>
+                </a:solidFill>
+                <a:highlight>
+                  <a:srgbClr val="D4D4D4"/>
+                </a:highlight>
+                <a:latin typeface="Courier New"/>
+              </a:rPr>
+              <a:t>"</a:t>
+            </a:r>
+            <a:r>
+              <a:rPr lang="en-US" sz="1000" dirty="0" err="1" smtClean="0">
+                <a:solidFill>
+                  <a:srgbClr val="2A00FF"/>
+                </a:solidFill>
+                <a:highlight>
+                  <a:srgbClr val="D4D4D4"/>
+                </a:highlight>
+                <a:latin typeface="Courier New"/>
+              </a:rPr>
+              <a:t>Msg</a:t>
+            </a:r>
+            <a:r>
+              <a:rPr lang="en-US" sz="1000" dirty="0" smtClean="0">
+                <a:solidFill>
+                  <a:srgbClr val="2A00FF"/>
+                </a:solidFill>
+                <a:highlight>
+                  <a:srgbClr val="D4D4D4"/>
+                </a:highlight>
+                <a:latin typeface="Courier New"/>
+              </a:rPr>
+              <a:t> from </a:t>
+            </a:r>
+            <a:r>
+              <a:rPr lang="en-US" sz="1000" dirty="0" err="1" smtClean="0">
+                <a:solidFill>
+                  <a:srgbClr val="2A00FF"/>
+                </a:solidFill>
+                <a:highlight>
+                  <a:srgbClr val="D4D4D4"/>
+                </a:highlight>
+                <a:latin typeface="Courier New"/>
+              </a:rPr>
+              <a:t>exernal</a:t>
+            </a:r>
+            <a:r>
+              <a:rPr lang="en-US" sz="1000" dirty="0" smtClean="0">
+                <a:solidFill>
+                  <a:srgbClr val="2A00FF"/>
+                </a:solidFill>
+                <a:highlight>
+                  <a:srgbClr val="D4D4D4"/>
+                </a:highlight>
+                <a:latin typeface="Courier New"/>
+              </a:rPr>
+              <a:t> bean"</a:t>
+            </a:r>
+            <a:r>
+              <a:rPr lang="en-US" sz="1000" dirty="0" smtClean="0">
+                <a:solidFill>
+                  <a:srgbClr val="000000"/>
+                </a:solidFill>
+                <a:highlight>
+                  <a:srgbClr val="D4D4D4"/>
+                </a:highlight>
+                <a:latin typeface="Courier New"/>
+              </a:rPr>
+              <a:t>);</a:t>
+            </a:r>
+          </a:p>
+          <a:p>
+            <a:pPr lvl="1"/>
+            <a:endParaRPr lang="en-US" sz="1000" dirty="0" smtClean="0">
+              <a:latin typeface="Courier New"/>
+            </a:endParaRPr>
+          </a:p>
+          <a:p>
+            <a:pPr lvl="1"/>
+            <a:r>
+              <a:rPr lang="en-US" sz="1000" b="1" dirty="0" smtClean="0">
+                <a:solidFill>
+                  <a:srgbClr val="7F0055"/>
+                </a:solidFill>
+                <a:latin typeface="Courier New"/>
+              </a:rPr>
+              <a:t>return</a:t>
+            </a:r>
+            <a:r>
+              <a:rPr lang="en-US" sz="1000" b="1" dirty="0" smtClean="0">
+                <a:solidFill>
+                  <a:srgbClr val="000000"/>
+                </a:solidFill>
+                <a:latin typeface="Courier New"/>
+              </a:rPr>
+              <a:t> </a:t>
+            </a:r>
+            <a:r>
+              <a:rPr lang="en-US" sz="1000" b="1" dirty="0" err="1" smtClean="0">
+                <a:solidFill>
+                  <a:srgbClr val="6A3E3E"/>
+                </a:solidFill>
+                <a:highlight>
+                  <a:srgbClr val="D4D4D4"/>
+                </a:highlight>
+                <a:latin typeface="Courier New"/>
+              </a:rPr>
+              <a:t>msg</a:t>
+            </a:r>
+            <a:r>
+              <a:rPr lang="en-US" sz="1000" b="1" dirty="0" smtClean="0">
+                <a:solidFill>
+                  <a:srgbClr val="000000"/>
+                </a:solidFill>
+                <a:highlight>
+                  <a:srgbClr val="D4D4D4"/>
+                </a:highlight>
+                <a:latin typeface="Courier New"/>
+              </a:rPr>
+              <a:t>;</a:t>
+            </a:r>
+          </a:p>
+          <a:p>
+            <a:r>
+              <a:rPr lang="en-US" sz="1000" dirty="0" smtClean="0">
+                <a:solidFill>
+                  <a:srgbClr val="000000"/>
+                </a:solidFill>
+                <a:latin typeface="Courier New"/>
+              </a:rPr>
+              <a:t>}</a:t>
+            </a:r>
+          </a:p>
+          <a:p>
+            <a:endParaRPr lang="en-US" sz="1100" dirty="0" smtClean="0"/>
+          </a:p>
+          <a:p>
+            <a:r>
+              <a:rPr lang="en-US" sz="1100" b="1" dirty="0" smtClean="0"/>
+              <a:t>Example of  Reading  Properties from </a:t>
+            </a:r>
+            <a:r>
+              <a:rPr lang="en-US" sz="1100" b="1" dirty="0" err="1" smtClean="0"/>
+              <a:t>application.properties</a:t>
+            </a:r>
+            <a:endParaRPr lang="en-US" sz="1100" b="1" dirty="0" smtClean="0"/>
+          </a:p>
+          <a:p>
+            <a:endParaRPr lang="en-US" sz="1100" u="sng" dirty="0" smtClean="0"/>
+          </a:p>
+          <a:p>
+            <a:r>
+              <a:rPr lang="en-US" sz="1100" dirty="0" err="1" smtClean="0"/>
+              <a:t>msg.text</a:t>
+            </a:r>
+            <a:r>
+              <a:rPr lang="en-US" sz="1100" dirty="0" smtClean="0"/>
+              <a:t>=This </a:t>
+            </a:r>
+            <a:r>
+              <a:rPr lang="en-US" sz="1100" dirty="0"/>
+              <a:t>is externalized text </a:t>
+            </a:r>
+            <a:r>
+              <a:rPr lang="en-US" sz="1100" dirty="0" smtClean="0"/>
+              <a:t>message</a:t>
+            </a:r>
+          </a:p>
+          <a:p>
+            <a:endParaRPr lang="en-US" sz="1100" b="1" dirty="0"/>
+          </a:p>
+          <a:p>
+            <a:r>
+              <a:rPr lang="en-US" sz="1000" dirty="0">
+                <a:solidFill>
+                  <a:srgbClr val="646464"/>
+                </a:solidFill>
+                <a:latin typeface="Courier New"/>
+              </a:rPr>
+              <a:t>@Value</a:t>
+            </a:r>
+            <a:r>
+              <a:rPr lang="en-US" sz="1000" dirty="0">
+                <a:solidFill>
+                  <a:srgbClr val="000000"/>
+                </a:solidFill>
+                <a:latin typeface="Courier New"/>
+              </a:rPr>
+              <a:t>(</a:t>
+            </a:r>
+            <a:r>
+              <a:rPr lang="en-US" sz="1000" dirty="0">
+                <a:solidFill>
+                  <a:srgbClr val="2A00FF"/>
+                </a:solidFill>
+                <a:latin typeface="Courier New"/>
+              </a:rPr>
+              <a:t>"${</a:t>
+            </a:r>
+            <a:r>
+              <a:rPr lang="en-US" sz="1000" dirty="0" err="1">
+                <a:solidFill>
+                  <a:srgbClr val="2A00FF"/>
+                </a:solidFill>
+                <a:latin typeface="Courier New"/>
+              </a:rPr>
+              <a:t>msg.text</a:t>
+            </a:r>
+            <a:r>
+              <a:rPr lang="en-US" sz="1000" dirty="0">
+                <a:solidFill>
+                  <a:srgbClr val="2A00FF"/>
+                </a:solidFill>
+                <a:latin typeface="Courier New"/>
+              </a:rPr>
+              <a:t>}"</a:t>
+            </a:r>
+            <a:r>
+              <a:rPr lang="en-US" sz="1000" dirty="0">
+                <a:solidFill>
+                  <a:srgbClr val="000000"/>
+                </a:solidFill>
+                <a:latin typeface="Courier New"/>
+              </a:rPr>
+              <a:t>)</a:t>
+            </a:r>
+          </a:p>
+          <a:p>
+            <a:r>
+              <a:rPr lang="en-US" sz="1000" b="1" dirty="0">
+                <a:solidFill>
+                  <a:srgbClr val="7F0055"/>
+                </a:solidFill>
+                <a:latin typeface="Courier New"/>
+              </a:rPr>
+              <a:t>private</a:t>
+            </a:r>
+            <a:r>
+              <a:rPr lang="en-US" sz="1000" b="1" dirty="0">
+                <a:solidFill>
+                  <a:srgbClr val="000000"/>
+                </a:solidFill>
+                <a:latin typeface="Courier New"/>
+              </a:rPr>
+              <a:t> String </a:t>
+            </a:r>
+            <a:r>
+              <a:rPr lang="en-US" sz="1000" b="1" dirty="0" err="1" smtClean="0">
+                <a:solidFill>
+                  <a:srgbClr val="000000"/>
+                </a:solidFill>
+                <a:latin typeface="Courier New"/>
+              </a:rPr>
+              <a:t>msgText</a:t>
+            </a:r>
+            <a:r>
+              <a:rPr lang="en-US" sz="1000" b="1" dirty="0" smtClean="0">
+                <a:solidFill>
+                  <a:srgbClr val="000000"/>
+                </a:solidFill>
+                <a:latin typeface="Courier New"/>
+              </a:rPr>
+              <a:t>;</a:t>
+            </a:r>
+            <a:endParaRPr lang="en-US" sz="1000" b="1" dirty="0" smtClean="0"/>
+          </a:p>
+          <a:p>
+            <a:pPr marL="171450" indent="-171450">
+              <a:buFontTx/>
+              <a:buChar char="-"/>
+            </a:pPr>
+            <a:endParaRPr lang="en-US" sz="1200" dirty="0"/>
+          </a:p>
+        </p:txBody>
+      </p:sp>
+      <p:sp>
+        <p:nvSpPr>
+          <p:cNvPr id="3" name="TextBox 2"/>
+          <p:cNvSpPr txBox="1"/>
+          <p:nvPr/>
+        </p:nvSpPr>
+        <p:spPr>
+          <a:xfrm>
+            <a:off x="7010400" y="228600"/>
+            <a:ext cx="2057400" cy="461665"/>
+          </a:xfrm>
+          <a:prstGeom prst="rect">
+            <a:avLst/>
+          </a:prstGeom>
+          <a:noFill/>
+        </p:spPr>
+        <p:txBody>
+          <a:bodyPr wrap="square" rtlCol="0">
+            <a:spAutoFit/>
+          </a:bodyPr>
+          <a:lstStyle/>
+          <a:p>
+            <a:r>
+              <a:rPr lang="en-US" sz="1200" dirty="0" smtClean="0"/>
+              <a:t>@Controller will be called by dispatcher servlet</a:t>
+            </a:r>
+            <a:endParaRPr lang="en-US" sz="1200" dirty="0"/>
+          </a:p>
+        </p:txBody>
+      </p:sp>
+    </p:spTree>
+    <p:extLst>
+      <p:ext uri="{BB962C8B-B14F-4D97-AF65-F5344CB8AC3E}">
+        <p14:creationId xmlns:p14="http://schemas.microsoft.com/office/powerpoint/2010/main" val="3787026041"/>
+      </p:ext>
+    </p:extLst>
+  </p:cSld>
+  <p:clrMapOvr>
+    <a:masterClrMapping/>
+  </p:clrMapOvr>
+</p:sld>
+</file>
+
+<file path=ppt/slides/slide7.xml><?xml version="1.0" encoding="utf-8"?>
+<p:sld xmlns:a="http://schemas.openxmlformats.org/drawingml/2006/main" xmlns:r="http://schemas.openxmlformats.org/officeDocument/2006/relationships" xmlns:p="http://schemas.openxmlformats.org/presentationml/2006/main">
+  <p:cSld>
+    <p:spTree>
+      <p:nvGrpSpPr>
+        <p:cNvPr id="1" name=""/>
+        <p:cNvGrpSpPr/>
+        <p:nvPr/>
+      </p:nvGrpSpPr>
+      <p:grpSpPr>
+        <a:xfrm>
+          <a:off x="0" y="0"/>
+          <a:ext cx="0" cy="0"/>
+          <a:chOff x="0" y="0"/>
+          <a:chExt cx="0" cy="0"/>
+        </a:xfrm>
+      </p:grpSpPr>
+      <p:sp>
+        <p:nvSpPr>
+          <p:cNvPr id="2" name="TextBox 1"/>
+          <p:cNvSpPr txBox="1"/>
+          <p:nvPr/>
+        </p:nvSpPr>
+        <p:spPr>
+          <a:xfrm>
+            <a:off x="381000" y="457200"/>
+            <a:ext cx="4759636" cy="1261884"/>
+          </a:xfrm>
+          <a:prstGeom prst="rect">
+            <a:avLst/>
+          </a:prstGeom>
+          <a:noFill/>
+        </p:spPr>
+        <p:txBody>
+          <a:bodyPr wrap="none" rtlCol="0">
+            <a:spAutoFit/>
+          </a:bodyPr>
+          <a:lstStyle/>
+          <a:p>
+            <a:r>
+              <a:rPr lang="en-US" dirty="0" smtClean="0"/>
+              <a:t>Data Persistence</a:t>
+            </a:r>
+          </a:p>
+          <a:p>
+            <a:endParaRPr lang="en-US" sz="1200" dirty="0" smtClean="0"/>
+          </a:p>
+          <a:p>
+            <a:pPr marL="171450" indent="-171450">
+              <a:buFontTx/>
+              <a:buChar char="-"/>
+            </a:pPr>
+            <a:r>
+              <a:rPr lang="en-US" sz="1200" dirty="0" err="1" smtClean="0"/>
+              <a:t>JDBCTemplate</a:t>
+            </a:r>
+            <a:r>
+              <a:rPr lang="en-US" sz="1200" dirty="0" smtClean="0"/>
+              <a:t> class – based on SQL commands</a:t>
+            </a:r>
+          </a:p>
+          <a:p>
+            <a:pPr marL="171450" indent="-171450">
+              <a:buFontTx/>
+              <a:buChar char="-"/>
+            </a:pPr>
+            <a:r>
+              <a:rPr lang="en-US" sz="1200" dirty="0" err="1" smtClean="0"/>
+              <a:t>JPARepository</a:t>
+            </a:r>
+            <a:r>
+              <a:rPr lang="en-US" sz="1200" dirty="0" smtClean="0"/>
+              <a:t> – based on ORM</a:t>
+            </a:r>
+          </a:p>
+          <a:p>
+            <a:endParaRPr lang="en-US" sz="1200" dirty="0"/>
+          </a:p>
+          <a:p>
+            <a:r>
+              <a:rPr lang="en-US" sz="1000" dirty="0">
+                <a:hlinkClick r:id="rId2"/>
+              </a:rPr>
+              <a:t>https://</a:t>
+            </a:r>
+            <a:r>
+              <a:rPr lang="en-US" sz="1000" dirty="0" smtClean="0">
+                <a:hlinkClick r:id="rId2"/>
+              </a:rPr>
+              <a:t>docs.spring.io/spring/docs/current/spring-framework-reference/html/jdbc.html</a:t>
+            </a:r>
+            <a:r>
+              <a:rPr lang="en-US" sz="1000" dirty="0" smtClean="0"/>
+              <a:t> </a:t>
+            </a:r>
+            <a:endParaRPr lang="en-US" dirty="0"/>
+          </a:p>
+        </p:txBody>
+      </p:sp>
+      <p:sp>
+        <p:nvSpPr>
+          <p:cNvPr id="3" name="TextBox 2"/>
+          <p:cNvSpPr txBox="1"/>
+          <p:nvPr/>
+        </p:nvSpPr>
+        <p:spPr>
+          <a:xfrm>
+            <a:off x="5343236" y="438727"/>
+            <a:ext cx="3475054" cy="1846659"/>
+          </a:xfrm>
+          <a:prstGeom prst="rect">
+            <a:avLst/>
+          </a:prstGeom>
+          <a:noFill/>
+        </p:spPr>
+        <p:txBody>
+          <a:bodyPr wrap="none" rtlCol="0">
+            <a:spAutoFit/>
+          </a:bodyPr>
+          <a:lstStyle/>
+          <a:p>
+            <a:r>
+              <a:rPr lang="en-US" dirty="0" smtClean="0"/>
+              <a:t>JDBC</a:t>
+            </a:r>
+          </a:p>
+          <a:p>
+            <a:pPr marL="171450" indent="-171450">
+              <a:buFontTx/>
+              <a:buChar char="-"/>
+            </a:pPr>
+            <a:r>
+              <a:rPr lang="en-US" sz="1200" dirty="0" smtClean="0"/>
+              <a:t>Register the drivers </a:t>
+            </a:r>
+            <a:r>
+              <a:rPr lang="en-US" sz="1200" dirty="0" smtClean="0">
+                <a:solidFill>
+                  <a:srgbClr val="00B050"/>
+                </a:solidFill>
+              </a:rPr>
+              <a:t>- fixed</a:t>
+            </a:r>
+          </a:p>
+          <a:p>
+            <a:pPr marL="171450" indent="-171450">
+              <a:buFontTx/>
+              <a:buChar char="-"/>
+            </a:pPr>
+            <a:r>
+              <a:rPr lang="en-US" sz="1200" dirty="0" smtClean="0"/>
+              <a:t>Providing the connection details</a:t>
+            </a:r>
+            <a:r>
+              <a:rPr lang="en-US" sz="1200" dirty="0">
+                <a:solidFill>
+                  <a:srgbClr val="00B050"/>
+                </a:solidFill>
+              </a:rPr>
+              <a:t> - fixed</a:t>
+            </a:r>
+            <a:endParaRPr lang="en-US" sz="1200" dirty="0" smtClean="0"/>
+          </a:p>
+          <a:p>
+            <a:pPr marL="171450" indent="-171450">
+              <a:buFontTx/>
+              <a:buChar char="-"/>
+            </a:pPr>
+            <a:r>
+              <a:rPr lang="en-US" sz="1200" dirty="0" smtClean="0"/>
+              <a:t>Getting the connection object</a:t>
+            </a:r>
+            <a:r>
+              <a:rPr lang="en-US" sz="1200" dirty="0">
+                <a:solidFill>
+                  <a:srgbClr val="00B050"/>
+                </a:solidFill>
+              </a:rPr>
+              <a:t> - fixed</a:t>
+            </a:r>
+            <a:endParaRPr lang="en-US" sz="1200" dirty="0" smtClean="0"/>
+          </a:p>
+          <a:p>
+            <a:pPr marL="171450" indent="-171450">
+              <a:buFontTx/>
+              <a:buChar char="-"/>
+            </a:pPr>
+            <a:r>
+              <a:rPr lang="en-US" sz="1200" dirty="0" smtClean="0"/>
+              <a:t>Create the statement / prepared statement</a:t>
+            </a:r>
+            <a:r>
+              <a:rPr lang="en-US" sz="1200" dirty="0">
+                <a:solidFill>
+                  <a:srgbClr val="00B050"/>
+                </a:solidFill>
+              </a:rPr>
+              <a:t> - fixed</a:t>
+            </a:r>
+            <a:endParaRPr lang="en-US" sz="1200" dirty="0" smtClean="0"/>
+          </a:p>
+          <a:p>
+            <a:pPr marL="171450" indent="-171450">
+              <a:buFontTx/>
+              <a:buChar char="-"/>
+            </a:pPr>
+            <a:r>
+              <a:rPr lang="en-US" sz="1200" dirty="0" smtClean="0"/>
+              <a:t>Forming the query </a:t>
+            </a:r>
+            <a:r>
+              <a:rPr lang="en-US" sz="1200" dirty="0" smtClean="0">
+                <a:solidFill>
+                  <a:srgbClr val="FF0000"/>
+                </a:solidFill>
+              </a:rPr>
+              <a:t>– change</a:t>
+            </a:r>
+          </a:p>
+          <a:p>
+            <a:pPr marL="171450" indent="-171450">
+              <a:buFontTx/>
+              <a:buChar char="-"/>
+            </a:pPr>
+            <a:r>
+              <a:rPr lang="en-US" sz="1200" dirty="0" smtClean="0"/>
+              <a:t>Getting the result set object</a:t>
+            </a:r>
+            <a:r>
+              <a:rPr lang="en-US" sz="1200" dirty="0">
+                <a:solidFill>
+                  <a:srgbClr val="00B050"/>
+                </a:solidFill>
+              </a:rPr>
+              <a:t> - fixed</a:t>
+            </a:r>
+            <a:endParaRPr lang="en-US" sz="1200" dirty="0" smtClean="0"/>
+          </a:p>
+          <a:p>
+            <a:pPr marL="171450" indent="-171450">
+              <a:buFontTx/>
+              <a:buChar char="-"/>
+            </a:pPr>
+            <a:r>
+              <a:rPr lang="en-US" sz="1200" dirty="0" smtClean="0"/>
+              <a:t>Iterating through the result set</a:t>
+            </a:r>
+            <a:r>
+              <a:rPr lang="en-US" sz="1200" dirty="0">
+                <a:solidFill>
+                  <a:srgbClr val="00B050"/>
+                </a:solidFill>
+              </a:rPr>
+              <a:t> </a:t>
+            </a:r>
+            <a:r>
+              <a:rPr lang="en-US" sz="1200" dirty="0" smtClean="0">
+                <a:solidFill>
+                  <a:srgbClr val="00B050"/>
+                </a:solidFill>
+              </a:rPr>
+              <a:t>– partially fixed</a:t>
+            </a:r>
+            <a:endParaRPr lang="en-US" sz="1200" dirty="0" smtClean="0"/>
+          </a:p>
+          <a:p>
+            <a:pPr marL="171450" indent="-171450">
+              <a:buFontTx/>
+              <a:buChar char="-"/>
+            </a:pPr>
+            <a:r>
+              <a:rPr lang="en-US" sz="1200" dirty="0" smtClean="0"/>
+              <a:t>Handling the </a:t>
+            </a:r>
+            <a:r>
+              <a:rPr lang="en-US" sz="1200" dirty="0" err="1" smtClean="0"/>
+              <a:t>SQLExceptions</a:t>
+            </a:r>
+            <a:r>
+              <a:rPr lang="en-US" sz="1200" dirty="0" smtClean="0"/>
+              <a:t> </a:t>
+            </a:r>
+            <a:r>
+              <a:rPr lang="en-US" sz="1200" dirty="0">
+                <a:solidFill>
+                  <a:srgbClr val="00B050"/>
+                </a:solidFill>
+              </a:rPr>
+              <a:t>- fixed</a:t>
+            </a:r>
+            <a:endParaRPr lang="en-US" sz="1200" dirty="0"/>
+          </a:p>
+        </p:txBody>
+      </p:sp>
+      <p:sp>
+        <p:nvSpPr>
+          <p:cNvPr id="9" name="Left Brace 8"/>
+          <p:cNvSpPr/>
+          <p:nvPr/>
+        </p:nvSpPr>
+        <p:spPr>
+          <a:xfrm>
+            <a:off x="5181600" y="609600"/>
+            <a:ext cx="161636" cy="1524000"/>
+          </a:xfrm>
+          <a:prstGeom prst="leftBrace">
+            <a:avLst/>
+          </a:prstGeom>
+        </p:spPr>
+        <p:style>
+          <a:lnRef idx="1">
+            <a:schemeClr val="accent1"/>
+          </a:lnRef>
+          <a:fillRef idx="0">
+            <a:schemeClr val="accent1"/>
+          </a:fillRef>
+          <a:effectRef idx="0">
+            <a:schemeClr val="accent1"/>
+          </a:effectRef>
+          <a:fontRef idx="minor">
+            <a:schemeClr val="tx1"/>
+          </a:fontRef>
+        </p:style>
+        <p:txBody>
+          <a:bodyPr rtlCol="0" anchor="ctr"/>
+          <a:lstStyle/>
+          <a:p>
+            <a:pPr algn="ctr"/>
+            <a:endParaRPr lang="en-US"/>
+          </a:p>
+        </p:txBody>
+      </p:sp>
+    </p:spTree>
+    <p:extLst>
+      <p:ext uri="{BB962C8B-B14F-4D97-AF65-F5344CB8AC3E}">
+        <p14:creationId xmlns:p14="http://schemas.microsoft.com/office/powerpoint/2010/main" val="611631970"/>
       </p:ext>
     </p:extLst>
   </p:cSld>

</xml_diff>